<commit_message>
Report, presentation and compressed file. Final.
</commit_message>
<xml_diff>
--- a/PCP_Presentation.pptx
+++ b/PCP_Presentation.pptx
@@ -6424,6 +6424,46 @@
           </a:prstGeom>
         </p:spPr>
       </p:pic>
+      <p:sp>
+        <p:nvSpPr>
+          <p:cNvPr id="2" name="TextBox 1">
+            <a:extLst>
+              <a:ext uri="{FF2B5EF4-FFF2-40B4-BE49-F238E27FC236}">
+                <a16:creationId xmlns:a16="http://schemas.microsoft.com/office/drawing/2014/main" id="{EF0E9130-98D3-4C9A-A048-F1D17E17F642}"/>
+              </a:ext>
+            </a:extLst>
+          </p:cNvPr>
+          <p:cNvSpPr txBox="1"/>
+          <p:nvPr/>
+        </p:nvSpPr>
+        <p:spPr>
+          <a:xfrm flipH="1">
+            <a:off x="8066761" y="1885950"/>
+            <a:ext cx="2502811" cy="369332"/>
+          </a:xfrm>
+          <a:prstGeom prst="rect">
+            <a:avLst/>
+          </a:prstGeom>
+          <a:noFill/>
+        </p:spPr>
+        <p:txBody>
+          <a:bodyPr wrap="square" rtlCol="0">
+            <a:spAutoFit/>
+          </a:bodyPr>
+          <a:lstStyle/>
+          <a:p>
+            <a:r>
+              <a:rPr lang="en-GB" dirty="0" err="1"/>
+              <a:t>Mapeamento</a:t>
+            </a:r>
+            <a:r>
+              <a:rPr lang="en-GB" dirty="0"/>
+              <a:t> por core</a:t>
+            </a:r>
+            <a:endParaRPr lang="pt-PT" dirty="0"/>
+          </a:p>
+        </p:txBody>
+      </p:sp>
     </p:spTree>
     <p:extLst>
       <p:ext uri="{BB962C8B-B14F-4D97-AF65-F5344CB8AC3E}">
@@ -6638,6 +6678,46 @@
           </a:prstGeom>
         </p:spPr>
       </p:pic>
+      <p:sp>
+        <p:nvSpPr>
+          <p:cNvPr id="8" name="TextBox 7">
+            <a:extLst>
+              <a:ext uri="{FF2B5EF4-FFF2-40B4-BE49-F238E27FC236}">
+                <a16:creationId xmlns:a16="http://schemas.microsoft.com/office/drawing/2014/main" id="{4D13C6D4-D7E8-4F2B-B676-04C601D6E9AE}"/>
+              </a:ext>
+            </a:extLst>
+          </p:cNvPr>
+          <p:cNvSpPr txBox="1"/>
+          <p:nvPr/>
+        </p:nvSpPr>
+        <p:spPr>
+          <a:xfrm flipH="1">
+            <a:off x="8066762" y="1885950"/>
+            <a:ext cx="2502811" cy="646331"/>
+          </a:xfrm>
+          <a:prstGeom prst="rect">
+            <a:avLst/>
+          </a:prstGeom>
+          <a:noFill/>
+        </p:spPr>
+        <p:txBody>
+          <a:bodyPr wrap="square" rtlCol="0">
+            <a:spAutoFit/>
+          </a:bodyPr>
+          <a:lstStyle/>
+          <a:p>
+            <a:r>
+              <a:rPr lang="en-GB" dirty="0" err="1"/>
+              <a:t>Mapeamento</a:t>
+            </a:r>
+            <a:r>
+              <a:rPr lang="en-GB" dirty="0"/>
+              <a:t> por socket</a:t>
+            </a:r>
+            <a:endParaRPr lang="pt-PT" dirty="0"/>
+          </a:p>
+        </p:txBody>
+      </p:sp>
     </p:spTree>
     <p:extLst>
       <p:ext uri="{BB962C8B-B14F-4D97-AF65-F5344CB8AC3E}">
@@ -6852,6 +6932,50 @@
           </a:prstGeom>
         </p:spPr>
       </p:pic>
+      <p:sp>
+        <p:nvSpPr>
+          <p:cNvPr id="8" name="TextBox 7">
+            <a:extLst>
+              <a:ext uri="{FF2B5EF4-FFF2-40B4-BE49-F238E27FC236}">
+                <a16:creationId xmlns:a16="http://schemas.microsoft.com/office/drawing/2014/main" id="{C9478160-722C-427C-9AB9-8497F6CC8DAC}"/>
+              </a:ext>
+            </a:extLst>
+          </p:cNvPr>
+          <p:cNvSpPr txBox="1"/>
+          <p:nvPr/>
+        </p:nvSpPr>
+        <p:spPr>
+          <a:xfrm flipH="1">
+            <a:off x="8066761" y="1885950"/>
+            <a:ext cx="2502811" cy="369332"/>
+          </a:xfrm>
+          <a:prstGeom prst="rect">
+            <a:avLst/>
+          </a:prstGeom>
+          <a:noFill/>
+        </p:spPr>
+        <p:txBody>
+          <a:bodyPr wrap="square" rtlCol="0">
+            <a:spAutoFit/>
+          </a:bodyPr>
+          <a:lstStyle/>
+          <a:p>
+            <a:r>
+              <a:rPr lang="en-GB" dirty="0" err="1"/>
+              <a:t>Mapeamento</a:t>
+            </a:r>
+            <a:r>
+              <a:rPr lang="en-GB" dirty="0"/>
+              <a:t> por </a:t>
+            </a:r>
+            <a:r>
+              <a:rPr lang="en-GB" dirty="0" err="1"/>
+              <a:t>nodo</a:t>
+            </a:r>
+            <a:endParaRPr lang="pt-PT" dirty="0"/>
+          </a:p>
+        </p:txBody>
+      </p:sp>
     </p:spTree>
     <p:extLst>
       <p:ext uri="{BB962C8B-B14F-4D97-AF65-F5344CB8AC3E}">
@@ -7751,6 +7875,41 @@
           <a:p>
             <a:pPr algn="ctr"/>
             <a:endParaRPr lang="en-US"/>
+          </a:p>
+        </p:txBody>
+      </p:sp>
+      <p:sp>
+        <p:nvSpPr>
+          <p:cNvPr id="18" name="TextBox 17">
+            <a:extLst>
+              <a:ext uri="{FF2B5EF4-FFF2-40B4-BE49-F238E27FC236}">
+                <a16:creationId xmlns:a16="http://schemas.microsoft.com/office/drawing/2014/main" id="{5F6C73E3-A13B-460A-AEAC-EC5C4704D65F}"/>
+              </a:ext>
+            </a:extLst>
+          </p:cNvPr>
+          <p:cNvSpPr txBox="1"/>
+          <p:nvPr/>
+        </p:nvSpPr>
+        <p:spPr>
+          <a:xfrm flipH="1">
+            <a:off x="8066761" y="1885950"/>
+            <a:ext cx="2502811" cy="369332"/>
+          </a:xfrm>
+          <a:prstGeom prst="rect">
+            <a:avLst/>
+          </a:prstGeom>
+          <a:noFill/>
+        </p:spPr>
+        <p:txBody>
+          <a:bodyPr wrap="square" rtlCol="0">
+            <a:spAutoFit/>
+          </a:bodyPr>
+          <a:lstStyle/>
+          <a:p>
+            <a:r>
+              <a:rPr lang="en-GB" i="1" dirty="0"/>
+              <a:t>Work Load</a:t>
+            </a:r>
           </a:p>
         </p:txBody>
       </p:sp>

</xml_diff>